<commit_message>
Added multi-variate analysis ppt
Added multi-variate analysis ppt and corrected pythn notebook
</commit_message>
<xml_diff>
--- a/Lending Club Case Study.pptx
+++ b/Lending Club Case Study.pptx
@@ -34,6 +34,14 @@
     <p:sldId id="332" r:id="rId31"/>
     <p:sldId id="334" r:id="rId32"/>
     <p:sldId id="333" r:id="rId33"/>
+    <p:sldId id="337" r:id="rId34"/>
+    <p:sldId id="338" r:id="rId35"/>
+    <p:sldId id="339" r:id="rId36"/>
+    <p:sldId id="340" r:id="rId37"/>
+    <p:sldId id="341" r:id="rId38"/>
+    <p:sldId id="342" r:id="rId39"/>
+    <p:sldId id="343" r:id="rId40"/>
+    <p:sldId id="344" r:id="rId41"/>
   </p:sldIdLst>
   <p:sldSz cx="12192000" cy="6858000"/>
   <p:notesSz cx="6858000" cy="9144000"/>
@@ -4438,7 +4446,7 @@
         </p:blipFill>
         <p:spPr>
           <a:xfrm>
-            <a:off x="1096963" y="2218340"/>
+            <a:off x="1096963" y="2237390"/>
             <a:ext cx="4640262" cy="3553207"/>
           </a:xfrm>
         </p:spPr>
@@ -6522,7 +6530,10 @@
           <a:bodyPr/>
           <a:lstStyle/>
           <a:p>
-            <a:endParaRPr lang="en-IN"/>
+            <a:pPr marL="0" indent="0">
+              <a:buNone/>
+            </a:pPr>
+            <a:endParaRPr lang="en-IN" dirty="0"/>
           </a:p>
         </p:txBody>
       </p:sp>
@@ -7188,8 +7199,11 @@
                   <a:srgbClr val="000000"/>
                 </a:solidFill>
                 <a:effectLst/>
-              </a:rPr>
-              <a:t>Not conclusive (open …needs discussion)</a:t>
+                <a:highlight>
+                  <a:srgbClr val="FFFF00"/>
+                </a:highlight>
+              </a:rPr>
+              <a:t>(open …needs discussion)…see the charged off and decide </a:t>
             </a:r>
           </a:p>
           <a:p>
@@ -7197,36 +7211,6 @@
           </a:p>
         </p:txBody>
       </p:sp>
-      <p:pic>
-        <p:nvPicPr>
-          <p:cNvPr id="8" name="Picture 7">
-            <a:extLst>
-              <a:ext uri="{FF2B5EF4-FFF2-40B4-BE49-F238E27FC236}">
-                <a16:creationId xmlns:a16="http://schemas.microsoft.com/office/drawing/2014/main" id="{60B676EA-9F63-419A-9D54-77F4829E7628}"/>
-              </a:ext>
-            </a:extLst>
-          </p:cNvPr>
-          <p:cNvPicPr>
-            <a:picLocks noChangeAspect="1"/>
-          </p:cNvPicPr>
-          <p:nvPr/>
-        </p:nvPicPr>
-        <p:blipFill>
-          <a:blip r:embed="rId2"/>
-          <a:stretch>
-            <a:fillRect/>
-          </a:stretch>
-        </p:blipFill>
-        <p:spPr>
-          <a:xfrm>
-            <a:off x="954405" y="2009774"/>
-            <a:ext cx="4707256" cy="4208253"/>
-          </a:xfrm>
-          <a:prstGeom prst="rect">
-            <a:avLst/>
-          </a:prstGeom>
-        </p:spPr>
-      </p:pic>
     </p:spTree>
     <p:extLst>
       <p:ext uri="{BB962C8B-B14F-4D97-AF65-F5344CB8AC3E}">
@@ -7495,9 +7479,25 @@
                 </a:solidFill>
                 <a:effectLst/>
               </a:rPr>
-              <a:t> is not showing a trend, 18-24% has comparatively higher chance of charged off </a:t>
-            </a:r>
-            <a:endParaRPr lang="en-IN" dirty="0"/>
+              <a:t> is not showing a trend, 18-24% has comparatively higher chance of charged off   </a:t>
+            </a:r>
+            <a:r>
+              <a:rPr lang="en-US" i="0" dirty="0">
+                <a:solidFill>
+                  <a:srgbClr val="000000"/>
+                </a:solidFill>
+                <a:effectLst/>
+                <a:highlight>
+                  <a:srgbClr val="FFFF00"/>
+                </a:highlight>
+              </a:rPr>
+              <a:t>(see insights of charged off )</a:t>
+            </a:r>
+            <a:endParaRPr lang="en-IN" dirty="0">
+              <a:highlight>
+                <a:srgbClr val="FFFF00"/>
+              </a:highlight>
+            </a:endParaRPr>
           </a:p>
         </p:txBody>
       </p:sp>
@@ -7633,10 +7633,17 @@
                 <a:solidFill>
                   <a:srgbClr val="000000"/>
                 </a:solidFill>
+                <a:highlight>
+                  <a:srgbClr val="FFFF00"/>
+                </a:highlight>
               </a:rPr>
               <a:t>Not conclusive</a:t>
             </a:r>
-            <a:endParaRPr lang="en-IN" dirty="0"/>
+            <a:endParaRPr lang="en-IN" dirty="0">
+              <a:highlight>
+                <a:srgbClr val="FFFF00"/>
+              </a:highlight>
+            </a:endParaRPr>
           </a:p>
         </p:txBody>
       </p:sp>
@@ -8395,6 +8402,2023 @@
     <p:extLst>
       <p:ext uri="{BB962C8B-B14F-4D97-AF65-F5344CB8AC3E}">
         <p14:creationId xmlns:p14="http://schemas.microsoft.com/office/powerpoint/2010/main" val="1140908147"/>
+      </p:ext>
+    </p:extLst>
+  </p:cSld>
+  <p:clrMapOvr>
+    <a:masterClrMapping/>
+  </p:clrMapOvr>
+</p:sld>
+</file>
+
+<file path=ppt/slides/slide30.xml><?xml version="1.0" encoding="utf-8"?>
+<p:sld xmlns:a="http://schemas.openxmlformats.org/drawingml/2006/main" xmlns:r="http://schemas.openxmlformats.org/officeDocument/2006/relationships" xmlns:p="http://schemas.openxmlformats.org/presentationml/2006/main">
+  <p:cSld>
+    <p:spTree>
+      <p:nvGrpSpPr>
+        <p:cNvPr id="1" name=""/>
+        <p:cNvGrpSpPr/>
+        <p:nvPr/>
+      </p:nvGrpSpPr>
+      <p:grpSpPr>
+        <a:xfrm>
+          <a:off x="0" y="0"/>
+          <a:ext cx="0" cy="0"/>
+          <a:chOff x="0" y="0"/>
+          <a:chExt cx="0" cy="0"/>
+        </a:xfrm>
+      </p:grpSpPr>
+      <p:sp>
+        <p:nvSpPr>
+          <p:cNvPr id="2" name="Title 1">
+            <a:extLst>
+              <a:ext uri="{FF2B5EF4-FFF2-40B4-BE49-F238E27FC236}">
+                <a16:creationId xmlns:a16="http://schemas.microsoft.com/office/drawing/2014/main" id="{FBB174D1-1FE4-47B5-927A-2D6F0439A899}"/>
+              </a:ext>
+            </a:extLst>
+          </p:cNvPr>
+          <p:cNvSpPr>
+            <a:spLocks noGrp="1"/>
+          </p:cNvSpPr>
+          <p:nvPr>
+            <p:ph type="title"/>
+          </p:nvPr>
+        </p:nvSpPr>
+        <p:spPr/>
+        <p:txBody>
+          <a:bodyPr/>
+          <a:lstStyle/>
+          <a:p>
+            <a:r>
+              <a:rPr lang="en-IN" dirty="0"/>
+              <a:t>Multi Variate Analysis</a:t>
+            </a:r>
+          </a:p>
+        </p:txBody>
+      </p:sp>
+      <p:pic>
+        <p:nvPicPr>
+          <p:cNvPr id="6" name="Content Placeholder 5">
+            <a:extLst>
+              <a:ext uri="{FF2B5EF4-FFF2-40B4-BE49-F238E27FC236}">
+                <a16:creationId xmlns:a16="http://schemas.microsoft.com/office/drawing/2014/main" id="{DFC09D99-71D2-404B-932F-4D1BC0B5E629}"/>
+              </a:ext>
+            </a:extLst>
+          </p:cNvPr>
+          <p:cNvPicPr>
+            <a:picLocks noGrp="1" noChangeAspect="1"/>
+          </p:cNvPicPr>
+          <p:nvPr>
+            <p:ph sz="half" idx="1"/>
+          </p:nvPr>
+        </p:nvPicPr>
+        <p:blipFill>
+          <a:blip r:embed="rId2"/>
+          <a:stretch>
+            <a:fillRect/>
+          </a:stretch>
+        </p:blipFill>
+        <p:spPr>
+          <a:xfrm>
+            <a:off x="1035795" y="3616960"/>
+            <a:ext cx="4640262" cy="2139563"/>
+          </a:xfrm>
+        </p:spPr>
+      </p:pic>
+      <p:pic>
+        <p:nvPicPr>
+          <p:cNvPr id="9" name="Content Placeholder 8">
+            <a:extLst>
+              <a:ext uri="{FF2B5EF4-FFF2-40B4-BE49-F238E27FC236}">
+                <a16:creationId xmlns:a16="http://schemas.microsoft.com/office/drawing/2014/main" id="{48F5631F-114D-43C4-A810-AD0EB8D1A41A}"/>
+              </a:ext>
+            </a:extLst>
+          </p:cNvPr>
+          <p:cNvPicPr>
+            <a:picLocks noGrp="1" noChangeAspect="1"/>
+          </p:cNvPicPr>
+          <p:nvPr>
+            <p:ph sz="half" idx="2"/>
+          </p:nvPr>
+        </p:nvPicPr>
+        <p:blipFill>
+          <a:blip r:embed="rId3"/>
+          <a:stretch>
+            <a:fillRect/>
+          </a:stretch>
+        </p:blipFill>
+        <p:spPr>
+          <a:xfrm>
+            <a:off x="5676058" y="3028951"/>
+            <a:ext cx="5868242" cy="3305174"/>
+          </a:xfrm>
+        </p:spPr>
+      </p:pic>
+      <p:sp>
+        <p:nvSpPr>
+          <p:cNvPr id="7" name="Rectangle 6">
+            <a:extLst>
+              <a:ext uri="{FF2B5EF4-FFF2-40B4-BE49-F238E27FC236}">
+                <a16:creationId xmlns:a16="http://schemas.microsoft.com/office/drawing/2014/main" id="{F1992EEB-3B02-4281-9770-D05E7C873FCF}"/>
+              </a:ext>
+            </a:extLst>
+          </p:cNvPr>
+          <p:cNvSpPr/>
+          <p:nvPr/>
+        </p:nvSpPr>
+        <p:spPr>
+          <a:xfrm>
+            <a:off x="1246138" y="2141856"/>
+            <a:ext cx="4219575" cy="1181100"/>
+          </a:xfrm>
+          <a:prstGeom prst="rect">
+            <a:avLst/>
+          </a:prstGeom>
+        </p:spPr>
+        <p:style>
+          <a:lnRef idx="2">
+            <a:schemeClr val="accent6"/>
+          </a:lnRef>
+          <a:fillRef idx="1">
+            <a:schemeClr val="lt1"/>
+          </a:fillRef>
+          <a:effectRef idx="0">
+            <a:schemeClr val="accent6"/>
+          </a:effectRef>
+          <a:fontRef idx="minor">
+            <a:schemeClr val="dk1"/>
+          </a:fontRef>
+        </p:style>
+        <p:txBody>
+          <a:bodyPr rtlCol="0" anchor="ctr"/>
+          <a:lstStyle/>
+          <a:p>
+            <a:pPr algn="ctr"/>
+            <a:r>
+              <a:rPr lang="en-IN" dirty="0"/>
+              <a:t>Grade G and Annual Income &lt; 52K chance of default is high</a:t>
+            </a:r>
+          </a:p>
+        </p:txBody>
+      </p:sp>
+      <p:sp>
+        <p:nvSpPr>
+          <p:cNvPr id="12" name="Rectangle 11">
+            <a:extLst>
+              <a:ext uri="{FF2B5EF4-FFF2-40B4-BE49-F238E27FC236}">
+                <a16:creationId xmlns:a16="http://schemas.microsoft.com/office/drawing/2014/main" id="{472C3A18-22BE-4522-8795-F67C5BE4F410}"/>
+              </a:ext>
+            </a:extLst>
+          </p:cNvPr>
+          <p:cNvSpPr/>
+          <p:nvPr/>
+        </p:nvSpPr>
+        <p:spPr>
+          <a:xfrm>
+            <a:off x="6096000" y="2086610"/>
+            <a:ext cx="4657725" cy="1028065"/>
+          </a:xfrm>
+          <a:prstGeom prst="rect">
+            <a:avLst/>
+          </a:prstGeom>
+        </p:spPr>
+        <p:style>
+          <a:lnRef idx="2">
+            <a:schemeClr val="accent6"/>
+          </a:lnRef>
+          <a:fillRef idx="1">
+            <a:schemeClr val="lt1"/>
+          </a:fillRef>
+          <a:effectRef idx="0">
+            <a:schemeClr val="accent6"/>
+          </a:effectRef>
+          <a:fontRef idx="minor">
+            <a:schemeClr val="dk1"/>
+          </a:fontRef>
+        </p:style>
+        <p:txBody>
+          <a:bodyPr rtlCol="0" anchor="ctr"/>
+          <a:lstStyle/>
+          <a:p>
+            <a:pPr algn="ctr"/>
+            <a:r>
+              <a:rPr lang="en-US" dirty="0"/>
+              <a:t>Purpose  is home improvement/major purchase &amp; income is lower than 80k/60k then higher chance of charged off</a:t>
+            </a:r>
+            <a:endParaRPr lang="en-IN" dirty="0"/>
+          </a:p>
+        </p:txBody>
+      </p:sp>
+    </p:spTree>
+    <p:extLst>
+      <p:ext uri="{BB962C8B-B14F-4D97-AF65-F5344CB8AC3E}">
+        <p14:creationId xmlns:p14="http://schemas.microsoft.com/office/powerpoint/2010/main" val="77807840"/>
+      </p:ext>
+    </p:extLst>
+  </p:cSld>
+  <p:clrMapOvr>
+    <a:masterClrMapping/>
+  </p:clrMapOvr>
+</p:sld>
+</file>
+
+<file path=ppt/slides/slide31.xml><?xml version="1.0" encoding="utf-8"?>
+<p:sld xmlns:a="http://schemas.openxmlformats.org/drawingml/2006/main" xmlns:r="http://schemas.openxmlformats.org/officeDocument/2006/relationships" xmlns:p="http://schemas.openxmlformats.org/presentationml/2006/main">
+  <p:cSld>
+    <p:spTree>
+      <p:nvGrpSpPr>
+        <p:cNvPr id="1" name=""/>
+        <p:cNvGrpSpPr/>
+        <p:nvPr/>
+      </p:nvGrpSpPr>
+      <p:grpSpPr>
+        <a:xfrm>
+          <a:off x="0" y="0"/>
+          <a:ext cx="0" cy="0"/>
+          <a:chOff x="0" y="0"/>
+          <a:chExt cx="0" cy="0"/>
+        </a:xfrm>
+      </p:grpSpPr>
+      <p:sp>
+        <p:nvSpPr>
+          <p:cNvPr id="2" name="Title 1">
+            <a:extLst>
+              <a:ext uri="{FF2B5EF4-FFF2-40B4-BE49-F238E27FC236}">
+                <a16:creationId xmlns:a16="http://schemas.microsoft.com/office/drawing/2014/main" id="{FBB174D1-1FE4-47B5-927A-2D6F0439A899}"/>
+              </a:ext>
+            </a:extLst>
+          </p:cNvPr>
+          <p:cNvSpPr>
+            <a:spLocks noGrp="1"/>
+          </p:cNvSpPr>
+          <p:nvPr>
+            <p:ph type="title"/>
+          </p:nvPr>
+        </p:nvSpPr>
+        <p:spPr/>
+        <p:txBody>
+          <a:bodyPr/>
+          <a:lstStyle/>
+          <a:p>
+            <a:r>
+              <a:rPr lang="en-IN" dirty="0"/>
+              <a:t>Multi Variate Analysis</a:t>
+            </a:r>
+          </a:p>
+        </p:txBody>
+      </p:sp>
+      <p:sp>
+        <p:nvSpPr>
+          <p:cNvPr id="7" name="Rectangle 6">
+            <a:extLst>
+              <a:ext uri="{FF2B5EF4-FFF2-40B4-BE49-F238E27FC236}">
+                <a16:creationId xmlns:a16="http://schemas.microsoft.com/office/drawing/2014/main" id="{F1992EEB-3B02-4281-9770-D05E7C873FCF}"/>
+              </a:ext>
+            </a:extLst>
+          </p:cNvPr>
+          <p:cNvSpPr/>
+          <p:nvPr/>
+        </p:nvSpPr>
+        <p:spPr>
+          <a:xfrm>
+            <a:off x="1246139" y="2160906"/>
+            <a:ext cx="5049886" cy="631749"/>
+          </a:xfrm>
+          <a:prstGeom prst="rect">
+            <a:avLst/>
+          </a:prstGeom>
+        </p:spPr>
+        <p:style>
+          <a:lnRef idx="2">
+            <a:schemeClr val="accent6"/>
+          </a:lnRef>
+          <a:fillRef idx="1">
+            <a:schemeClr val="lt1"/>
+          </a:fillRef>
+          <a:effectRef idx="0">
+            <a:schemeClr val="accent6"/>
+          </a:effectRef>
+          <a:fontRef idx="minor">
+            <a:schemeClr val="dk1"/>
+          </a:fontRef>
+        </p:style>
+        <p:txBody>
+          <a:bodyPr rtlCol="0" anchor="ctr"/>
+          <a:lstStyle/>
+          <a:p>
+            <a:pPr algn="l"/>
+            <a:r>
+              <a:rPr lang="en-US" sz="1400" i="0" dirty="0">
+                <a:solidFill>
+                  <a:srgbClr val="000000"/>
+                </a:solidFill>
+                <a:effectLst/>
+                <a:latin typeface="Helvetica Neue"/>
+              </a:rPr>
+              <a:t>States WA, TX, NJ, VA higher loan amount has a higher chance of charged off</a:t>
+            </a:r>
+          </a:p>
+        </p:txBody>
+      </p:sp>
+      <p:sp>
+        <p:nvSpPr>
+          <p:cNvPr id="4" name="Content Placeholder 3">
+            <a:extLst>
+              <a:ext uri="{FF2B5EF4-FFF2-40B4-BE49-F238E27FC236}">
+                <a16:creationId xmlns:a16="http://schemas.microsoft.com/office/drawing/2014/main" id="{2FF67C81-88BB-4EA2-A79F-9D03221884C7}"/>
+              </a:ext>
+            </a:extLst>
+          </p:cNvPr>
+          <p:cNvSpPr>
+            <a:spLocks noGrp="1"/>
+          </p:cNvSpPr>
+          <p:nvPr>
+            <p:ph sz="half" idx="1"/>
+          </p:nvPr>
+        </p:nvSpPr>
+        <p:spPr>
+          <a:xfrm>
+            <a:off x="1097280" y="3322956"/>
+            <a:ext cx="4219575" cy="2287269"/>
+          </a:xfrm>
+        </p:spPr>
+        <p:txBody>
+          <a:bodyPr/>
+          <a:lstStyle/>
+          <a:p>
+            <a:endParaRPr lang="en-IN" dirty="0"/>
+          </a:p>
+        </p:txBody>
+      </p:sp>
+      <p:pic>
+        <p:nvPicPr>
+          <p:cNvPr id="8" name="Picture 7">
+            <a:extLst>
+              <a:ext uri="{FF2B5EF4-FFF2-40B4-BE49-F238E27FC236}">
+                <a16:creationId xmlns:a16="http://schemas.microsoft.com/office/drawing/2014/main" id="{80150361-CE97-4173-A341-E3B2C880271D}"/>
+              </a:ext>
+            </a:extLst>
+          </p:cNvPr>
+          <p:cNvPicPr>
+            <a:picLocks noChangeAspect="1"/>
+          </p:cNvPicPr>
+          <p:nvPr/>
+        </p:nvPicPr>
+        <p:blipFill>
+          <a:blip r:embed="rId2"/>
+          <a:stretch>
+            <a:fillRect/>
+          </a:stretch>
+        </p:blipFill>
+        <p:spPr>
+          <a:xfrm>
+            <a:off x="933449" y="2792655"/>
+            <a:ext cx="6315076" cy="3011169"/>
+          </a:xfrm>
+          <a:prstGeom prst="rect">
+            <a:avLst/>
+          </a:prstGeom>
+        </p:spPr>
+      </p:pic>
+      <p:pic>
+        <p:nvPicPr>
+          <p:cNvPr id="14" name="Picture 13">
+            <a:extLst>
+              <a:ext uri="{FF2B5EF4-FFF2-40B4-BE49-F238E27FC236}">
+                <a16:creationId xmlns:a16="http://schemas.microsoft.com/office/drawing/2014/main" id="{7536A16A-2328-45E1-863F-089BFDD2D3E9}"/>
+              </a:ext>
+            </a:extLst>
+          </p:cNvPr>
+          <p:cNvPicPr>
+            <a:picLocks noChangeAspect="1"/>
+          </p:cNvPicPr>
+          <p:nvPr/>
+        </p:nvPicPr>
+        <p:blipFill>
+          <a:blip r:embed="rId3"/>
+          <a:stretch>
+            <a:fillRect/>
+          </a:stretch>
+        </p:blipFill>
+        <p:spPr>
+          <a:xfrm>
+            <a:off x="6696075" y="2945917"/>
+            <a:ext cx="4459604" cy="2680976"/>
+          </a:xfrm>
+          <a:prstGeom prst="rect">
+            <a:avLst/>
+          </a:prstGeom>
+        </p:spPr>
+      </p:pic>
+      <p:sp>
+        <p:nvSpPr>
+          <p:cNvPr id="15" name="Rectangle 14">
+            <a:extLst>
+              <a:ext uri="{FF2B5EF4-FFF2-40B4-BE49-F238E27FC236}">
+                <a16:creationId xmlns:a16="http://schemas.microsoft.com/office/drawing/2014/main" id="{482A9412-ED09-4195-B146-F4B3A85BF8B2}"/>
+              </a:ext>
+            </a:extLst>
+          </p:cNvPr>
+          <p:cNvSpPr/>
+          <p:nvPr/>
+        </p:nvSpPr>
+        <p:spPr>
+          <a:xfrm>
+            <a:off x="6896100" y="2126160"/>
+            <a:ext cx="4259580" cy="819757"/>
+          </a:xfrm>
+          <a:prstGeom prst="rect">
+            <a:avLst/>
+          </a:prstGeom>
+        </p:spPr>
+        <p:style>
+          <a:lnRef idx="2">
+            <a:schemeClr val="accent6"/>
+          </a:lnRef>
+          <a:fillRef idx="1">
+            <a:schemeClr val="lt1"/>
+          </a:fillRef>
+          <a:effectRef idx="0">
+            <a:schemeClr val="accent6"/>
+          </a:effectRef>
+          <a:fontRef idx="minor">
+            <a:schemeClr val="dk1"/>
+          </a:fontRef>
+        </p:style>
+        <p:txBody>
+          <a:bodyPr rtlCol="0" anchor="ctr"/>
+          <a:lstStyle/>
+          <a:p>
+            <a:pPr algn="l"/>
+            <a:r>
+              <a:rPr lang="en-US" sz="1400" dirty="0">
+                <a:solidFill>
+                  <a:srgbClr val="000000"/>
+                </a:solidFill>
+                <a:highlight>
+                  <a:srgbClr val="FFFF00"/>
+                </a:highlight>
+                <a:latin typeface="Helvetica Neue"/>
+              </a:rPr>
+              <a:t>A</a:t>
+            </a:r>
+            <a:r>
+              <a:rPr lang="en-US" sz="1400" i="0" dirty="0">
+                <a:solidFill>
+                  <a:srgbClr val="000000"/>
+                </a:solidFill>
+                <a:effectLst/>
+                <a:highlight>
+                  <a:srgbClr val="FFFF00"/>
+                </a:highlight>
+                <a:latin typeface="Helvetica Neue"/>
+              </a:rPr>
+              <a:t>ll purposes higher </a:t>
+            </a:r>
+            <a:r>
+              <a:rPr lang="en-US" sz="1400" i="0" dirty="0" err="1">
+                <a:solidFill>
+                  <a:srgbClr val="000000"/>
+                </a:solidFill>
+                <a:effectLst/>
+                <a:highlight>
+                  <a:srgbClr val="FFFF00"/>
+                </a:highlight>
+                <a:latin typeface="Helvetica Neue"/>
+              </a:rPr>
+              <a:t>dti</a:t>
+            </a:r>
+            <a:r>
+              <a:rPr lang="en-US" sz="1400" i="0" dirty="0">
+                <a:solidFill>
+                  <a:srgbClr val="000000"/>
+                </a:solidFill>
+                <a:effectLst/>
+                <a:highlight>
+                  <a:srgbClr val="FFFF00"/>
+                </a:highlight>
+                <a:latin typeface="Helvetica Neue"/>
+              </a:rPr>
+              <a:t> means higher chance of charged off, but educational, lower </a:t>
+            </a:r>
+            <a:r>
+              <a:rPr lang="en-US" sz="1400" i="0" dirty="0" err="1">
+                <a:solidFill>
+                  <a:srgbClr val="000000"/>
+                </a:solidFill>
+                <a:effectLst/>
+                <a:highlight>
+                  <a:srgbClr val="FFFF00"/>
+                </a:highlight>
+                <a:latin typeface="Helvetica Neue"/>
+              </a:rPr>
+              <a:t>dti</a:t>
+            </a:r>
+            <a:r>
+              <a:rPr lang="en-US" sz="1400" i="0" dirty="0">
+                <a:solidFill>
+                  <a:srgbClr val="000000"/>
+                </a:solidFill>
+                <a:effectLst/>
+                <a:highlight>
+                  <a:srgbClr val="FFFF00"/>
+                </a:highlight>
+                <a:latin typeface="Helvetica Neue"/>
+              </a:rPr>
+              <a:t> also leads to </a:t>
+            </a:r>
+            <a:r>
+              <a:rPr lang="en-US" sz="1400" i="0" dirty="0" err="1">
+                <a:solidFill>
+                  <a:srgbClr val="000000"/>
+                </a:solidFill>
+                <a:effectLst/>
+                <a:highlight>
+                  <a:srgbClr val="FFFF00"/>
+                </a:highlight>
+                <a:latin typeface="Helvetica Neue"/>
+              </a:rPr>
+              <a:t>chargeoff</a:t>
+            </a:r>
+            <a:r>
+              <a:rPr lang="en-US" sz="1400" i="0" dirty="0">
+                <a:solidFill>
+                  <a:srgbClr val="000000"/>
+                </a:solidFill>
+                <a:effectLst/>
+                <a:highlight>
+                  <a:srgbClr val="FFFF00"/>
+                </a:highlight>
+                <a:latin typeface="Helvetica Neue"/>
+              </a:rPr>
+              <a:t> (not valid)</a:t>
+            </a:r>
+          </a:p>
+        </p:txBody>
+      </p:sp>
+    </p:spTree>
+    <p:extLst>
+      <p:ext uri="{BB962C8B-B14F-4D97-AF65-F5344CB8AC3E}">
+        <p14:creationId xmlns:p14="http://schemas.microsoft.com/office/powerpoint/2010/main" val="4202900754"/>
+      </p:ext>
+    </p:extLst>
+  </p:cSld>
+  <p:clrMapOvr>
+    <a:masterClrMapping/>
+  </p:clrMapOvr>
+</p:sld>
+</file>
+
+<file path=ppt/slides/slide32.xml><?xml version="1.0" encoding="utf-8"?>
+<p:sld xmlns:a="http://schemas.openxmlformats.org/drawingml/2006/main" xmlns:r="http://schemas.openxmlformats.org/officeDocument/2006/relationships" xmlns:p="http://schemas.openxmlformats.org/presentationml/2006/main">
+  <p:cSld>
+    <p:spTree>
+      <p:nvGrpSpPr>
+        <p:cNvPr id="1" name=""/>
+        <p:cNvGrpSpPr/>
+        <p:nvPr/>
+      </p:nvGrpSpPr>
+      <p:grpSpPr>
+        <a:xfrm>
+          <a:off x="0" y="0"/>
+          <a:ext cx="0" cy="0"/>
+          <a:chOff x="0" y="0"/>
+          <a:chExt cx="0" cy="0"/>
+        </a:xfrm>
+      </p:grpSpPr>
+      <p:sp>
+        <p:nvSpPr>
+          <p:cNvPr id="2" name="Title 1">
+            <a:extLst>
+              <a:ext uri="{FF2B5EF4-FFF2-40B4-BE49-F238E27FC236}">
+                <a16:creationId xmlns:a16="http://schemas.microsoft.com/office/drawing/2014/main" id="{FBB174D1-1FE4-47B5-927A-2D6F0439A899}"/>
+              </a:ext>
+            </a:extLst>
+          </p:cNvPr>
+          <p:cNvSpPr>
+            <a:spLocks noGrp="1"/>
+          </p:cNvSpPr>
+          <p:nvPr>
+            <p:ph type="title"/>
+          </p:nvPr>
+        </p:nvSpPr>
+        <p:spPr/>
+        <p:txBody>
+          <a:bodyPr/>
+          <a:lstStyle/>
+          <a:p>
+            <a:r>
+              <a:rPr lang="en-IN" dirty="0"/>
+              <a:t>Multi Variate Analysis</a:t>
+            </a:r>
+          </a:p>
+        </p:txBody>
+      </p:sp>
+      <p:sp>
+        <p:nvSpPr>
+          <p:cNvPr id="7" name="Rectangle 6">
+            <a:extLst>
+              <a:ext uri="{FF2B5EF4-FFF2-40B4-BE49-F238E27FC236}">
+                <a16:creationId xmlns:a16="http://schemas.microsoft.com/office/drawing/2014/main" id="{F1992EEB-3B02-4281-9770-D05E7C873FCF}"/>
+              </a:ext>
+            </a:extLst>
+          </p:cNvPr>
+          <p:cNvSpPr/>
+          <p:nvPr/>
+        </p:nvSpPr>
+        <p:spPr>
+          <a:xfrm>
+            <a:off x="1104492" y="2114399"/>
+            <a:ext cx="4420417" cy="631749"/>
+          </a:xfrm>
+          <a:prstGeom prst="rect">
+            <a:avLst/>
+          </a:prstGeom>
+        </p:spPr>
+        <p:style>
+          <a:lnRef idx="2">
+            <a:schemeClr val="accent6"/>
+          </a:lnRef>
+          <a:fillRef idx="1">
+            <a:schemeClr val="lt1"/>
+          </a:fillRef>
+          <a:effectRef idx="0">
+            <a:schemeClr val="accent6"/>
+          </a:effectRef>
+          <a:fontRef idx="minor">
+            <a:schemeClr val="dk1"/>
+          </a:fontRef>
+        </p:style>
+        <p:txBody>
+          <a:bodyPr rtlCol="0" anchor="ctr"/>
+          <a:lstStyle/>
+          <a:p>
+            <a:pPr algn="l"/>
+            <a:r>
+              <a:rPr lang="en-US" sz="1400" i="0" dirty="0">
+                <a:solidFill>
+                  <a:srgbClr val="000000"/>
+                </a:solidFill>
+                <a:effectLst/>
+                <a:latin typeface="Helvetica Neue"/>
+              </a:rPr>
+              <a:t>Funded Amount Inv is higher if source is verified for all loan status (charged off and fully paid)</a:t>
+            </a:r>
+          </a:p>
+        </p:txBody>
+      </p:sp>
+      <p:sp>
+        <p:nvSpPr>
+          <p:cNvPr id="4" name="Content Placeholder 3">
+            <a:extLst>
+              <a:ext uri="{FF2B5EF4-FFF2-40B4-BE49-F238E27FC236}">
+                <a16:creationId xmlns:a16="http://schemas.microsoft.com/office/drawing/2014/main" id="{2FF67C81-88BB-4EA2-A79F-9D03221884C7}"/>
+              </a:ext>
+            </a:extLst>
+          </p:cNvPr>
+          <p:cNvSpPr>
+            <a:spLocks noGrp="1"/>
+          </p:cNvSpPr>
+          <p:nvPr>
+            <p:ph sz="half" idx="1"/>
+          </p:nvPr>
+        </p:nvSpPr>
+        <p:spPr>
+          <a:xfrm>
+            <a:off x="1097280" y="3322956"/>
+            <a:ext cx="4219575" cy="2287269"/>
+          </a:xfrm>
+        </p:spPr>
+        <p:txBody>
+          <a:bodyPr/>
+          <a:lstStyle/>
+          <a:p>
+            <a:endParaRPr lang="en-IN" dirty="0"/>
+          </a:p>
+        </p:txBody>
+      </p:sp>
+      <p:pic>
+        <p:nvPicPr>
+          <p:cNvPr id="5" name="Picture 4">
+            <a:extLst>
+              <a:ext uri="{FF2B5EF4-FFF2-40B4-BE49-F238E27FC236}">
+                <a16:creationId xmlns:a16="http://schemas.microsoft.com/office/drawing/2014/main" id="{D9C17389-7885-41F5-B6CD-8EBEC1340A9E}"/>
+              </a:ext>
+            </a:extLst>
+          </p:cNvPr>
+          <p:cNvPicPr>
+            <a:picLocks noChangeAspect="1"/>
+          </p:cNvPicPr>
+          <p:nvPr/>
+        </p:nvPicPr>
+        <p:blipFill>
+          <a:blip r:embed="rId2"/>
+          <a:stretch>
+            <a:fillRect/>
+          </a:stretch>
+        </p:blipFill>
+        <p:spPr>
+          <a:xfrm>
+            <a:off x="904876" y="2945917"/>
+            <a:ext cx="4819650" cy="2722934"/>
+          </a:xfrm>
+          <a:prstGeom prst="rect">
+            <a:avLst/>
+          </a:prstGeom>
+        </p:spPr>
+      </p:pic>
+    </p:spTree>
+    <p:extLst>
+      <p:ext uri="{BB962C8B-B14F-4D97-AF65-F5344CB8AC3E}">
+        <p14:creationId xmlns:p14="http://schemas.microsoft.com/office/powerpoint/2010/main" val="2351098325"/>
+      </p:ext>
+    </p:extLst>
+  </p:cSld>
+  <p:clrMapOvr>
+    <a:masterClrMapping/>
+  </p:clrMapOvr>
+</p:sld>
+</file>
+
+<file path=ppt/slides/slide33.xml><?xml version="1.0" encoding="utf-8"?>
+<p:sld xmlns:a="http://schemas.openxmlformats.org/drawingml/2006/main" xmlns:r="http://schemas.openxmlformats.org/officeDocument/2006/relationships" xmlns:p="http://schemas.openxmlformats.org/presentationml/2006/main">
+  <p:cSld>
+    <p:spTree>
+      <p:nvGrpSpPr>
+        <p:cNvPr id="1" name=""/>
+        <p:cNvGrpSpPr/>
+        <p:nvPr/>
+      </p:nvGrpSpPr>
+      <p:grpSpPr>
+        <a:xfrm>
+          <a:off x="0" y="0"/>
+          <a:ext cx="0" cy="0"/>
+          <a:chOff x="0" y="0"/>
+          <a:chExt cx="0" cy="0"/>
+        </a:xfrm>
+      </p:grpSpPr>
+      <p:sp>
+        <p:nvSpPr>
+          <p:cNvPr id="2" name="Title 1">
+            <a:extLst>
+              <a:ext uri="{FF2B5EF4-FFF2-40B4-BE49-F238E27FC236}">
+                <a16:creationId xmlns:a16="http://schemas.microsoft.com/office/drawing/2014/main" id="{754E26B7-90AE-4543-9A82-20D893E89482}"/>
+              </a:ext>
+            </a:extLst>
+          </p:cNvPr>
+          <p:cNvSpPr>
+            <a:spLocks noGrp="1"/>
+          </p:cNvSpPr>
+          <p:nvPr>
+            <p:ph type="title"/>
+          </p:nvPr>
+        </p:nvSpPr>
+        <p:spPr/>
+        <p:txBody>
+          <a:bodyPr/>
+          <a:lstStyle/>
+          <a:p>
+            <a:r>
+              <a:rPr lang="en-IN" dirty="0"/>
+              <a:t>Multi-Variate Analysis (Pair Plot)</a:t>
+            </a:r>
+          </a:p>
+        </p:txBody>
+      </p:sp>
+      <p:pic>
+        <p:nvPicPr>
+          <p:cNvPr id="6" name="Content Placeholder 5">
+            <a:extLst>
+              <a:ext uri="{FF2B5EF4-FFF2-40B4-BE49-F238E27FC236}">
+                <a16:creationId xmlns:a16="http://schemas.microsoft.com/office/drawing/2014/main" id="{17890CFC-510E-44E4-8EAE-5CC137C6064D}"/>
+              </a:ext>
+            </a:extLst>
+          </p:cNvPr>
+          <p:cNvPicPr>
+            <a:picLocks noGrp="1" noChangeAspect="1"/>
+          </p:cNvPicPr>
+          <p:nvPr>
+            <p:ph sz="half" idx="1"/>
+          </p:nvPr>
+        </p:nvPicPr>
+        <p:blipFill>
+          <a:blip r:embed="rId2"/>
+          <a:stretch>
+            <a:fillRect/>
+          </a:stretch>
+        </p:blipFill>
+        <p:spPr>
+          <a:xfrm>
+            <a:off x="640080" y="2120900"/>
+            <a:ext cx="5875863" cy="3748088"/>
+          </a:xfrm>
+        </p:spPr>
+      </p:pic>
+      <p:sp>
+        <p:nvSpPr>
+          <p:cNvPr id="4" name="Content Placeholder 3">
+            <a:extLst>
+              <a:ext uri="{FF2B5EF4-FFF2-40B4-BE49-F238E27FC236}">
+                <a16:creationId xmlns:a16="http://schemas.microsoft.com/office/drawing/2014/main" id="{603AA567-4CFC-4924-B009-E19F4C1CBD70}"/>
+              </a:ext>
+            </a:extLst>
+          </p:cNvPr>
+          <p:cNvSpPr>
+            <a:spLocks noGrp="1"/>
+          </p:cNvSpPr>
+          <p:nvPr>
+            <p:ph sz="half" idx="2"/>
+          </p:nvPr>
+        </p:nvSpPr>
+        <p:spPr/>
+        <p:txBody>
+          <a:bodyPr>
+            <a:normAutofit/>
+          </a:bodyPr>
+          <a:lstStyle/>
+          <a:p>
+            <a:r>
+              <a:rPr lang="en-IN" sz="1000" dirty="0"/>
+              <a:t>1.Loan amount and funded amount is positively correlated</a:t>
+            </a:r>
+          </a:p>
+          <a:p>
+            <a:r>
+              <a:rPr lang="en-IN" sz="1000" dirty="0"/>
+              <a:t>2.</a:t>
+            </a:r>
+            <a:r>
+              <a:rPr lang="en-US" sz="1000" dirty="0"/>
+              <a:t>lower interest rate &lt;=18 &amp; funded amount &lt;=20000 were using term 36 months. </a:t>
+            </a:r>
+          </a:p>
+          <a:p>
+            <a:r>
+              <a:rPr lang="en-US" sz="1000" dirty="0"/>
+              <a:t>3. Higher interest rate :&gt;25 and funded amount </a:t>
+            </a:r>
+            <a:r>
+              <a:rPr lang="en-US" sz="1000" dirty="0" err="1"/>
+              <a:t>upto</a:t>
+            </a:r>
+            <a:r>
+              <a:rPr lang="en-US" sz="1000" dirty="0"/>
+              <a:t> 30000 were using loan </a:t>
+            </a:r>
+            <a:r>
+              <a:rPr lang="en-US" sz="1000" dirty="0" err="1"/>
+              <a:t>tearm</a:t>
+            </a:r>
+            <a:r>
+              <a:rPr lang="en-US" sz="1000" dirty="0"/>
+              <a:t> 60 months</a:t>
+            </a:r>
+          </a:p>
+          <a:p>
+            <a:r>
+              <a:rPr lang="en-US" sz="1000" dirty="0"/>
+              <a:t>4. Irrespective of </a:t>
+            </a:r>
+            <a:r>
+              <a:rPr lang="en-US" sz="1000" dirty="0" err="1"/>
+              <a:t>emp_length</a:t>
+            </a:r>
+            <a:r>
+              <a:rPr lang="en-US" sz="1000" dirty="0"/>
+              <a:t> , when funded amount &gt; 20000 loan term used is 60 months </a:t>
+            </a:r>
+          </a:p>
+          <a:p>
+            <a:r>
+              <a:rPr lang="en-US" sz="1000" dirty="0"/>
+              <a:t>5. Irrespective of </a:t>
+            </a:r>
+            <a:r>
+              <a:rPr lang="en-US" sz="1000" dirty="0" err="1"/>
+              <a:t>emp_length</a:t>
+            </a:r>
+            <a:r>
+              <a:rPr lang="en-US" sz="1000" dirty="0"/>
+              <a:t> , when funded amount &lt; 20000 term used is 36 months</a:t>
+            </a:r>
+          </a:p>
+          <a:p>
+            <a:r>
+              <a:rPr lang="en-US" sz="1000" dirty="0"/>
+              <a:t>6. if loan amount &gt; 20000, more 60 months term is observed , loan amount &lt; 20000 36 months term is used</a:t>
+            </a:r>
+          </a:p>
+          <a:p>
+            <a:r>
+              <a:rPr lang="en-US" sz="1000" dirty="0"/>
+              <a:t>7. if funded amount &gt; 20000, more 60 months is observed , funded amount &lt; 20000 36 months is applied</a:t>
+            </a:r>
+          </a:p>
+          <a:p>
+            <a:r>
+              <a:rPr lang="en-US" sz="1000" dirty="0"/>
+              <a:t>8. </a:t>
+            </a:r>
+            <a:r>
+              <a:rPr lang="en-US" sz="900" b="1" i="0" dirty="0">
+                <a:solidFill>
+                  <a:srgbClr val="000000"/>
+                </a:solidFill>
+                <a:effectLst/>
+                <a:latin typeface="Helvetica Neue"/>
+              </a:rPr>
+              <a:t> </a:t>
+            </a:r>
+            <a:r>
+              <a:rPr lang="en-US" sz="900" i="0" dirty="0">
+                <a:solidFill>
+                  <a:srgbClr val="000000"/>
+                </a:solidFill>
+                <a:effectLst/>
+                <a:latin typeface="Helvetica Neue"/>
+              </a:rPr>
+              <a:t>A</a:t>
+            </a:r>
+            <a:r>
+              <a:rPr lang="en-US" sz="1000" dirty="0"/>
+              <a:t>cross all emp length for lower int rate &lt;=18 , 36 months is used. for int rate above 18 , 60 months is observed</a:t>
+            </a:r>
+          </a:p>
+          <a:p>
+            <a:endParaRPr lang="en-US" sz="1000" dirty="0"/>
+          </a:p>
+          <a:p>
+            <a:endParaRPr lang="en-US" sz="1000" dirty="0"/>
+          </a:p>
+          <a:p>
+            <a:endParaRPr lang="en-US" sz="1000" dirty="0"/>
+          </a:p>
+          <a:p>
+            <a:endParaRPr lang="en-US" sz="1000" dirty="0"/>
+          </a:p>
+          <a:p>
+            <a:endParaRPr lang="en-US" sz="1000" dirty="0"/>
+          </a:p>
+          <a:p>
+            <a:endParaRPr lang="en-IN" sz="1000" dirty="0"/>
+          </a:p>
+        </p:txBody>
+      </p:sp>
+    </p:spTree>
+    <p:extLst>
+      <p:ext uri="{BB962C8B-B14F-4D97-AF65-F5344CB8AC3E}">
+        <p14:creationId xmlns:p14="http://schemas.microsoft.com/office/powerpoint/2010/main" val="1354317784"/>
+      </p:ext>
+    </p:extLst>
+  </p:cSld>
+  <p:clrMapOvr>
+    <a:masterClrMapping/>
+  </p:clrMapOvr>
+</p:sld>
+</file>
+
+<file path=ppt/slides/slide34.xml><?xml version="1.0" encoding="utf-8"?>
+<p:sld xmlns:a="http://schemas.openxmlformats.org/drawingml/2006/main" xmlns:r="http://schemas.openxmlformats.org/officeDocument/2006/relationships" xmlns:p="http://schemas.openxmlformats.org/presentationml/2006/main">
+  <p:cSld>
+    <p:spTree>
+      <p:nvGrpSpPr>
+        <p:cNvPr id="1" name=""/>
+        <p:cNvGrpSpPr/>
+        <p:nvPr/>
+      </p:nvGrpSpPr>
+      <p:grpSpPr>
+        <a:xfrm>
+          <a:off x="0" y="0"/>
+          <a:ext cx="0" cy="0"/>
+          <a:chOff x="0" y="0"/>
+          <a:chExt cx="0" cy="0"/>
+        </a:xfrm>
+      </p:grpSpPr>
+      <p:sp>
+        <p:nvSpPr>
+          <p:cNvPr id="2" name="Title 1">
+            <a:extLst>
+              <a:ext uri="{FF2B5EF4-FFF2-40B4-BE49-F238E27FC236}">
+                <a16:creationId xmlns:a16="http://schemas.microsoft.com/office/drawing/2014/main" id="{754E26B7-90AE-4543-9A82-20D893E89482}"/>
+              </a:ext>
+            </a:extLst>
+          </p:cNvPr>
+          <p:cNvSpPr>
+            <a:spLocks noGrp="1"/>
+          </p:cNvSpPr>
+          <p:nvPr>
+            <p:ph type="title"/>
+          </p:nvPr>
+        </p:nvSpPr>
+        <p:spPr/>
+        <p:txBody>
+          <a:bodyPr/>
+          <a:lstStyle/>
+          <a:p>
+            <a:r>
+              <a:rPr lang="en-IN" dirty="0"/>
+              <a:t>Multi-Variate Analysis (Pair Plot)</a:t>
+            </a:r>
+          </a:p>
+        </p:txBody>
+      </p:sp>
+      <p:sp>
+        <p:nvSpPr>
+          <p:cNvPr id="4" name="Content Placeholder 3">
+            <a:extLst>
+              <a:ext uri="{FF2B5EF4-FFF2-40B4-BE49-F238E27FC236}">
+                <a16:creationId xmlns:a16="http://schemas.microsoft.com/office/drawing/2014/main" id="{603AA567-4CFC-4924-B009-E19F4C1CBD70}"/>
+              </a:ext>
+            </a:extLst>
+          </p:cNvPr>
+          <p:cNvSpPr>
+            <a:spLocks noGrp="1"/>
+          </p:cNvSpPr>
+          <p:nvPr>
+            <p:ph sz="half" idx="2"/>
+          </p:nvPr>
+        </p:nvSpPr>
+        <p:spPr/>
+        <p:txBody>
+          <a:bodyPr>
+            <a:normAutofit/>
+          </a:bodyPr>
+          <a:lstStyle/>
+          <a:p>
+            <a:r>
+              <a:rPr lang="en-IN" sz="1400" dirty="0"/>
+              <a:t>1. </a:t>
+            </a:r>
+            <a:r>
+              <a:rPr lang="en-US" sz="1400" dirty="0">
+                <a:solidFill>
+                  <a:srgbClr val="000000"/>
+                </a:solidFill>
+              </a:rPr>
+              <a:t>A</a:t>
+            </a:r>
+            <a:r>
+              <a:rPr lang="en-US" sz="1400" i="0" dirty="0">
+                <a:solidFill>
+                  <a:srgbClr val="000000"/>
+                </a:solidFill>
+                <a:effectLst/>
+              </a:rPr>
+              <a:t>cross all emp length with lower int rate till 10 , more is fully paid, Across all emp length once when the int rate &gt; 10 both fully paid and charged off is there</a:t>
+            </a:r>
+          </a:p>
+          <a:p>
+            <a:r>
+              <a:rPr lang="en-US" sz="1400" dirty="0">
+                <a:solidFill>
+                  <a:srgbClr val="000000"/>
+                </a:solidFill>
+              </a:rPr>
+              <a:t>2. Between </a:t>
+            </a:r>
+            <a:r>
+              <a:rPr lang="en-US" sz="1400" dirty="0" err="1">
+                <a:solidFill>
+                  <a:srgbClr val="000000"/>
+                </a:solidFill>
+              </a:rPr>
+              <a:t>emp_length</a:t>
+            </a:r>
+            <a:r>
+              <a:rPr lang="en-US" sz="1400" dirty="0">
+                <a:solidFill>
+                  <a:srgbClr val="000000"/>
+                </a:solidFill>
+              </a:rPr>
+              <a:t> vs funded amount , no clean </a:t>
+            </a:r>
+            <a:r>
+              <a:rPr lang="en-US" sz="1400" dirty="0" err="1">
+                <a:solidFill>
+                  <a:srgbClr val="000000"/>
+                </a:solidFill>
+              </a:rPr>
+              <a:t>seperation</a:t>
+            </a:r>
+            <a:r>
+              <a:rPr lang="en-US" sz="1400" dirty="0">
+                <a:solidFill>
+                  <a:srgbClr val="000000"/>
+                </a:solidFill>
+              </a:rPr>
+              <a:t> is observed</a:t>
+            </a:r>
+          </a:p>
+          <a:p>
+            <a:r>
+              <a:rPr lang="en-US" sz="1400" dirty="0">
+                <a:solidFill>
+                  <a:srgbClr val="000000"/>
+                </a:solidFill>
+              </a:rPr>
+              <a:t>3. Between </a:t>
+            </a:r>
+            <a:r>
+              <a:rPr lang="en-US" sz="1400" dirty="0" err="1">
+                <a:solidFill>
+                  <a:srgbClr val="000000"/>
+                </a:solidFill>
+              </a:rPr>
+              <a:t>int_rate</a:t>
+            </a:r>
+            <a:r>
+              <a:rPr lang="en-US" sz="1400" dirty="0">
+                <a:solidFill>
+                  <a:srgbClr val="000000"/>
+                </a:solidFill>
+              </a:rPr>
+              <a:t> vs funded amount no clean </a:t>
+            </a:r>
+            <a:r>
+              <a:rPr lang="en-US" sz="1400" dirty="0" err="1">
+                <a:solidFill>
+                  <a:srgbClr val="000000"/>
+                </a:solidFill>
+              </a:rPr>
+              <a:t>seperation</a:t>
+            </a:r>
+            <a:r>
+              <a:rPr lang="en-US" sz="1400" dirty="0">
+                <a:solidFill>
+                  <a:srgbClr val="000000"/>
+                </a:solidFill>
+              </a:rPr>
+              <a:t> observed between fully paid vs charged off</a:t>
+            </a:r>
+          </a:p>
+          <a:p>
+            <a:r>
+              <a:rPr lang="en-US" sz="1400" i="0" dirty="0">
+                <a:solidFill>
+                  <a:srgbClr val="000000"/>
+                </a:solidFill>
+                <a:effectLst/>
+              </a:rPr>
+              <a:t>4. Between </a:t>
+            </a:r>
+            <a:r>
+              <a:rPr lang="en-US" sz="1400" i="0" dirty="0" err="1">
+                <a:solidFill>
+                  <a:srgbClr val="000000"/>
+                </a:solidFill>
+                <a:effectLst/>
+              </a:rPr>
+              <a:t>int_rate</a:t>
+            </a:r>
+            <a:r>
+              <a:rPr lang="en-US" sz="1400" i="0" dirty="0">
+                <a:solidFill>
+                  <a:srgbClr val="000000"/>
+                </a:solidFill>
+                <a:effectLst/>
+              </a:rPr>
+              <a:t> vs recovery , recoveries were zero for fully paid irrespective of int rate . </a:t>
+            </a:r>
+            <a:r>
+              <a:rPr lang="en-US" sz="1400" i="0" dirty="0" err="1">
+                <a:solidFill>
+                  <a:srgbClr val="000000"/>
+                </a:solidFill>
+                <a:effectLst/>
+              </a:rPr>
+              <a:t>recorveries</a:t>
+            </a:r>
+            <a:r>
+              <a:rPr lang="en-US" sz="1400" i="0" dirty="0">
+                <a:solidFill>
+                  <a:srgbClr val="000000"/>
+                </a:solidFill>
+                <a:effectLst/>
+              </a:rPr>
+              <a:t> were higher for charged off </a:t>
+            </a:r>
+            <a:r>
+              <a:rPr lang="en-US" sz="1400" i="0" dirty="0" err="1">
+                <a:solidFill>
+                  <a:srgbClr val="000000"/>
+                </a:solidFill>
+                <a:effectLst/>
+              </a:rPr>
+              <a:t>acorss</a:t>
+            </a:r>
+            <a:r>
+              <a:rPr lang="en-US" sz="1400" i="0" dirty="0">
+                <a:solidFill>
+                  <a:srgbClr val="000000"/>
+                </a:solidFill>
+                <a:effectLst/>
+              </a:rPr>
+              <a:t> all emp length (same applied for all recovery. Recoveries is closely associated to charged off . Not for fully paid)</a:t>
+            </a:r>
+          </a:p>
+          <a:p>
+            <a:endParaRPr lang="en-US" sz="1400" i="0" dirty="0">
+              <a:solidFill>
+                <a:srgbClr val="000000"/>
+              </a:solidFill>
+              <a:effectLst/>
+            </a:endParaRPr>
+          </a:p>
+          <a:p>
+            <a:endParaRPr lang="en-US" sz="1000" dirty="0"/>
+          </a:p>
+          <a:p>
+            <a:endParaRPr lang="en-US" sz="1000" dirty="0"/>
+          </a:p>
+          <a:p>
+            <a:endParaRPr lang="en-US" sz="1000" dirty="0"/>
+          </a:p>
+          <a:p>
+            <a:endParaRPr lang="en-US" sz="1000" dirty="0"/>
+          </a:p>
+          <a:p>
+            <a:endParaRPr lang="en-US" sz="1000" dirty="0"/>
+          </a:p>
+          <a:p>
+            <a:endParaRPr lang="en-IN" sz="1000" dirty="0"/>
+          </a:p>
+        </p:txBody>
+      </p:sp>
+      <p:sp>
+        <p:nvSpPr>
+          <p:cNvPr id="5" name="Content Placeholder 4">
+            <a:extLst>
+              <a:ext uri="{FF2B5EF4-FFF2-40B4-BE49-F238E27FC236}">
+                <a16:creationId xmlns:a16="http://schemas.microsoft.com/office/drawing/2014/main" id="{86FE6264-3C84-456D-8C16-015E5B3EC609}"/>
+              </a:ext>
+            </a:extLst>
+          </p:cNvPr>
+          <p:cNvSpPr>
+            <a:spLocks noGrp="1"/>
+          </p:cNvSpPr>
+          <p:nvPr>
+            <p:ph sz="half" idx="1"/>
+          </p:nvPr>
+        </p:nvSpPr>
+        <p:spPr/>
+        <p:txBody>
+          <a:bodyPr/>
+          <a:lstStyle/>
+          <a:p>
+            <a:endParaRPr lang="en-IN"/>
+          </a:p>
+        </p:txBody>
+      </p:sp>
+      <p:pic>
+        <p:nvPicPr>
+          <p:cNvPr id="8" name="Picture 7">
+            <a:extLst>
+              <a:ext uri="{FF2B5EF4-FFF2-40B4-BE49-F238E27FC236}">
+                <a16:creationId xmlns:a16="http://schemas.microsoft.com/office/drawing/2014/main" id="{FD33A0FF-E586-4586-9DA1-B32593834900}"/>
+              </a:ext>
+            </a:extLst>
+          </p:cNvPr>
+          <p:cNvPicPr>
+            <a:picLocks noChangeAspect="1"/>
+          </p:cNvPicPr>
+          <p:nvPr/>
+        </p:nvPicPr>
+        <p:blipFill>
+          <a:blip r:embed="rId2"/>
+          <a:stretch>
+            <a:fillRect/>
+          </a:stretch>
+        </p:blipFill>
+        <p:spPr>
+          <a:xfrm>
+            <a:off x="1097280" y="2120900"/>
+            <a:ext cx="4578777" cy="3937000"/>
+          </a:xfrm>
+          <a:prstGeom prst="rect">
+            <a:avLst/>
+          </a:prstGeom>
+        </p:spPr>
+      </p:pic>
+    </p:spTree>
+    <p:extLst>
+      <p:ext uri="{BB962C8B-B14F-4D97-AF65-F5344CB8AC3E}">
+        <p14:creationId xmlns:p14="http://schemas.microsoft.com/office/powerpoint/2010/main" val="1799222017"/>
+      </p:ext>
+    </p:extLst>
+  </p:cSld>
+  <p:clrMapOvr>
+    <a:masterClrMapping/>
+  </p:clrMapOvr>
+</p:sld>
+</file>
+
+<file path=ppt/slides/slide35.xml><?xml version="1.0" encoding="utf-8"?>
+<p:sld xmlns:a="http://schemas.openxmlformats.org/drawingml/2006/main" xmlns:r="http://schemas.openxmlformats.org/officeDocument/2006/relationships" xmlns:p="http://schemas.openxmlformats.org/presentationml/2006/main">
+  <p:cSld>
+    <p:spTree>
+      <p:nvGrpSpPr>
+        <p:cNvPr id="1" name=""/>
+        <p:cNvGrpSpPr/>
+        <p:nvPr/>
+      </p:nvGrpSpPr>
+      <p:grpSpPr>
+        <a:xfrm>
+          <a:off x="0" y="0"/>
+          <a:ext cx="0" cy="0"/>
+          <a:chOff x="0" y="0"/>
+          <a:chExt cx="0" cy="0"/>
+        </a:xfrm>
+      </p:grpSpPr>
+      <p:sp>
+        <p:nvSpPr>
+          <p:cNvPr id="2" name="Title 1">
+            <a:extLst>
+              <a:ext uri="{FF2B5EF4-FFF2-40B4-BE49-F238E27FC236}">
+                <a16:creationId xmlns:a16="http://schemas.microsoft.com/office/drawing/2014/main" id="{383196C9-DDCF-4E48-8347-C4295EE1A19C}"/>
+              </a:ext>
+            </a:extLst>
+          </p:cNvPr>
+          <p:cNvSpPr>
+            <a:spLocks noGrp="1"/>
+          </p:cNvSpPr>
+          <p:nvPr>
+            <p:ph type="title"/>
+          </p:nvPr>
+        </p:nvSpPr>
+        <p:spPr/>
+        <p:txBody>
+          <a:bodyPr/>
+          <a:lstStyle/>
+          <a:p>
+            <a:r>
+              <a:rPr lang="en-IN" dirty="0"/>
+              <a:t>Multi-Variate Analysis</a:t>
+            </a:r>
+          </a:p>
+        </p:txBody>
+      </p:sp>
+      <p:sp>
+        <p:nvSpPr>
+          <p:cNvPr id="3" name="Content Placeholder 2">
+            <a:extLst>
+              <a:ext uri="{FF2B5EF4-FFF2-40B4-BE49-F238E27FC236}">
+                <a16:creationId xmlns:a16="http://schemas.microsoft.com/office/drawing/2014/main" id="{A703DAD1-D69F-4F25-AFA8-4EF32042E8BA}"/>
+              </a:ext>
+            </a:extLst>
+          </p:cNvPr>
+          <p:cNvSpPr>
+            <a:spLocks noGrp="1"/>
+          </p:cNvSpPr>
+          <p:nvPr>
+            <p:ph sz="half" idx="1"/>
+          </p:nvPr>
+        </p:nvSpPr>
+        <p:spPr/>
+        <p:txBody>
+          <a:bodyPr>
+            <a:normAutofit/>
+          </a:bodyPr>
+          <a:lstStyle/>
+          <a:p>
+            <a:endParaRPr lang="en-IN"/>
+          </a:p>
+        </p:txBody>
+      </p:sp>
+      <p:sp>
+        <p:nvSpPr>
+          <p:cNvPr id="4" name="Content Placeholder 3">
+            <a:extLst>
+              <a:ext uri="{FF2B5EF4-FFF2-40B4-BE49-F238E27FC236}">
+                <a16:creationId xmlns:a16="http://schemas.microsoft.com/office/drawing/2014/main" id="{7A6FE539-0958-4066-8FD6-CCD85E79D231}"/>
+              </a:ext>
+            </a:extLst>
+          </p:cNvPr>
+          <p:cNvSpPr>
+            <a:spLocks noGrp="1"/>
+          </p:cNvSpPr>
+          <p:nvPr>
+            <p:ph sz="half" idx="2"/>
+          </p:nvPr>
+        </p:nvSpPr>
+        <p:spPr>
+          <a:xfrm>
+            <a:off x="5868462" y="2120900"/>
+            <a:ext cx="5287218" cy="3748194"/>
+          </a:xfrm>
+        </p:spPr>
+        <p:txBody>
+          <a:bodyPr>
+            <a:normAutofit/>
+          </a:bodyPr>
+          <a:lstStyle/>
+          <a:p>
+            <a:r>
+              <a:rPr lang="en-IN" sz="1100" dirty="0"/>
+              <a:t>1. </a:t>
+            </a:r>
+            <a:r>
+              <a:rPr lang="en-US" sz="1100" i="0" dirty="0">
+                <a:solidFill>
+                  <a:srgbClr val="000000"/>
+                </a:solidFill>
+                <a:effectLst/>
+              </a:rPr>
+              <a:t>loan status towards fully paid is influenced by features like annual income , more higher the annual income more is fully paid</a:t>
+            </a:r>
+          </a:p>
+          <a:p>
+            <a:r>
+              <a:rPr lang="en-US" sz="1100" dirty="0">
+                <a:solidFill>
+                  <a:srgbClr val="000000"/>
+                </a:solidFill>
+              </a:rPr>
+              <a:t>2. loan status towards charged off is influenced by features like </a:t>
+            </a:r>
+          </a:p>
+          <a:p>
+            <a:r>
+              <a:rPr lang="en-US" sz="1100" dirty="0">
+                <a:solidFill>
+                  <a:srgbClr val="000000"/>
+                </a:solidFill>
+              </a:rPr>
+              <a:t>a, funded amount (Higher funded amount lower is fully paid(higher is charged off)</a:t>
+            </a:r>
+          </a:p>
+          <a:p>
+            <a:r>
+              <a:rPr lang="en-US" sz="1100" dirty="0">
+                <a:solidFill>
+                  <a:srgbClr val="000000"/>
+                </a:solidFill>
+              </a:rPr>
+              <a:t>b. </a:t>
+            </a:r>
+            <a:r>
+              <a:rPr lang="en-US" sz="1100" dirty="0" err="1">
+                <a:solidFill>
+                  <a:srgbClr val="000000"/>
+                </a:solidFill>
+              </a:rPr>
+              <a:t>int_rate</a:t>
+            </a:r>
+            <a:r>
+              <a:rPr lang="en-US" sz="1100" dirty="0">
+                <a:solidFill>
+                  <a:srgbClr val="000000"/>
+                </a:solidFill>
+              </a:rPr>
+              <a:t> (Higher int rate lower is fully paid(higher is charged off), </a:t>
+            </a:r>
+          </a:p>
+          <a:p>
+            <a:r>
+              <a:rPr lang="en-US" sz="1100" dirty="0">
+                <a:solidFill>
+                  <a:srgbClr val="000000"/>
+                </a:solidFill>
+              </a:rPr>
+              <a:t>c. </a:t>
+            </a:r>
+            <a:r>
+              <a:rPr lang="en-US" sz="1100" dirty="0" err="1">
+                <a:solidFill>
+                  <a:srgbClr val="000000"/>
+                </a:solidFill>
+              </a:rPr>
+              <a:t>dti</a:t>
+            </a:r>
+            <a:r>
+              <a:rPr lang="en-US" sz="1100" dirty="0">
+                <a:solidFill>
+                  <a:srgbClr val="000000"/>
+                </a:solidFill>
+              </a:rPr>
+              <a:t> (Higher </a:t>
+            </a:r>
+            <a:r>
+              <a:rPr lang="en-US" sz="1100" dirty="0" err="1">
+                <a:solidFill>
+                  <a:srgbClr val="000000"/>
+                </a:solidFill>
+              </a:rPr>
+              <a:t>dti</a:t>
+            </a:r>
+            <a:r>
+              <a:rPr lang="en-US" sz="1100" dirty="0">
+                <a:solidFill>
+                  <a:srgbClr val="000000"/>
+                </a:solidFill>
+              </a:rPr>
+              <a:t> lower is fully paid(higher is charged off), </a:t>
+            </a:r>
+          </a:p>
+          <a:p>
+            <a:r>
+              <a:rPr lang="en-US" sz="1100" dirty="0">
+                <a:solidFill>
+                  <a:srgbClr val="000000"/>
+                </a:solidFill>
+              </a:rPr>
+              <a:t>d. pub rec bankruptcies, ((Higher pub rec bankruptcies lower is fully paid(higher is charged off)</a:t>
+            </a:r>
+          </a:p>
+          <a:p>
+            <a:r>
+              <a:rPr lang="en-US" sz="1100" dirty="0">
+                <a:solidFill>
+                  <a:srgbClr val="000000"/>
+                </a:solidFill>
+              </a:rPr>
+              <a:t>e. emp length year, (Higher emp length year  lower is fully paid(higher is charged off)</a:t>
+            </a:r>
+          </a:p>
+          <a:p>
+            <a:r>
+              <a:rPr lang="en-US" sz="1100" dirty="0">
+                <a:solidFill>
+                  <a:srgbClr val="000000"/>
+                </a:solidFill>
+              </a:rPr>
+              <a:t>f. </a:t>
+            </a:r>
+            <a:r>
+              <a:rPr lang="en-US" sz="1100" dirty="0" err="1">
+                <a:solidFill>
+                  <a:srgbClr val="000000"/>
+                </a:solidFill>
+              </a:rPr>
+              <a:t>revol_util_rate</a:t>
+            </a:r>
+            <a:r>
+              <a:rPr lang="en-US" sz="1100" dirty="0">
+                <a:solidFill>
+                  <a:srgbClr val="000000"/>
+                </a:solidFill>
+              </a:rPr>
+              <a:t>, emp title (Higher </a:t>
+            </a:r>
+            <a:r>
+              <a:rPr lang="en-US" sz="1100" dirty="0" err="1">
+                <a:solidFill>
+                  <a:srgbClr val="000000"/>
+                </a:solidFill>
+              </a:rPr>
+              <a:t>revol</a:t>
+            </a:r>
+            <a:r>
+              <a:rPr lang="en-US" sz="1100" dirty="0">
+                <a:solidFill>
+                  <a:srgbClr val="000000"/>
+                </a:solidFill>
+              </a:rPr>
+              <a:t> util rate  lower is fully paid(higher is charged off)</a:t>
+            </a:r>
+          </a:p>
+          <a:p>
+            <a:r>
+              <a:rPr lang="en-US" sz="1100" dirty="0">
+                <a:solidFill>
+                  <a:srgbClr val="000000"/>
+                </a:solidFill>
+                <a:highlight>
+                  <a:srgbClr val="FFFF00"/>
+                </a:highlight>
+              </a:rPr>
+              <a:t>if emp title is absent more higher is charged off , et</a:t>
+            </a:r>
+          </a:p>
+          <a:p>
+            <a:endParaRPr lang="en-US" sz="1100" i="0" dirty="0">
+              <a:solidFill>
+                <a:srgbClr val="000000"/>
+              </a:solidFill>
+              <a:effectLst/>
+            </a:endParaRPr>
+          </a:p>
+          <a:p>
+            <a:endParaRPr lang="en-IN" sz="1100" dirty="0"/>
+          </a:p>
+        </p:txBody>
+      </p:sp>
+      <p:pic>
+        <p:nvPicPr>
+          <p:cNvPr id="8" name="Picture 7">
+            <a:extLst>
+              <a:ext uri="{FF2B5EF4-FFF2-40B4-BE49-F238E27FC236}">
+                <a16:creationId xmlns:a16="http://schemas.microsoft.com/office/drawing/2014/main" id="{7B93D203-15CF-49A4-9AEC-A0DD1067677E}"/>
+              </a:ext>
+            </a:extLst>
+          </p:cNvPr>
+          <p:cNvPicPr>
+            <a:picLocks noChangeAspect="1"/>
+          </p:cNvPicPr>
+          <p:nvPr/>
+        </p:nvPicPr>
+        <p:blipFill>
+          <a:blip r:embed="rId2"/>
+          <a:stretch>
+            <a:fillRect/>
+          </a:stretch>
+        </p:blipFill>
+        <p:spPr>
+          <a:xfrm>
+            <a:off x="1097279" y="2120900"/>
+            <a:ext cx="4639735" cy="3748193"/>
+          </a:xfrm>
+          <a:prstGeom prst="rect">
+            <a:avLst/>
+          </a:prstGeom>
+        </p:spPr>
+      </p:pic>
+    </p:spTree>
+    <p:extLst>
+      <p:ext uri="{BB962C8B-B14F-4D97-AF65-F5344CB8AC3E}">
+        <p14:creationId xmlns:p14="http://schemas.microsoft.com/office/powerpoint/2010/main" val="1211427069"/>
+      </p:ext>
+    </p:extLst>
+  </p:cSld>
+  <p:clrMapOvr>
+    <a:masterClrMapping/>
+  </p:clrMapOvr>
+</p:sld>
+</file>
+
+<file path=ppt/slides/slide36.xml><?xml version="1.0" encoding="utf-8"?>
+<p:sld xmlns:a="http://schemas.openxmlformats.org/drawingml/2006/main" xmlns:r="http://schemas.openxmlformats.org/officeDocument/2006/relationships" xmlns:p="http://schemas.openxmlformats.org/presentationml/2006/main">
+  <p:cSld>
+    <p:spTree>
+      <p:nvGrpSpPr>
+        <p:cNvPr id="1" name=""/>
+        <p:cNvGrpSpPr/>
+        <p:nvPr/>
+      </p:nvGrpSpPr>
+      <p:grpSpPr>
+        <a:xfrm>
+          <a:off x="0" y="0"/>
+          <a:ext cx="0" cy="0"/>
+          <a:chOff x="0" y="0"/>
+          <a:chExt cx="0" cy="0"/>
+        </a:xfrm>
+      </p:grpSpPr>
+      <p:sp>
+        <p:nvSpPr>
+          <p:cNvPr id="2" name="Title 1">
+            <a:extLst>
+              <a:ext uri="{FF2B5EF4-FFF2-40B4-BE49-F238E27FC236}">
+                <a16:creationId xmlns:a16="http://schemas.microsoft.com/office/drawing/2014/main" id="{59F34ABC-2235-4CBC-9553-461B4DE66757}"/>
+              </a:ext>
+            </a:extLst>
+          </p:cNvPr>
+          <p:cNvSpPr>
+            <a:spLocks noGrp="1"/>
+          </p:cNvSpPr>
+          <p:nvPr>
+            <p:ph type="title"/>
+          </p:nvPr>
+        </p:nvSpPr>
+        <p:spPr/>
+        <p:txBody>
+          <a:bodyPr/>
+          <a:lstStyle/>
+          <a:p>
+            <a:r>
+              <a:rPr lang="en-IN" dirty="0"/>
+              <a:t>Conclusion</a:t>
+            </a:r>
+          </a:p>
+        </p:txBody>
+      </p:sp>
+      <p:sp>
+        <p:nvSpPr>
+          <p:cNvPr id="3" name="Content Placeholder 2">
+            <a:extLst>
+              <a:ext uri="{FF2B5EF4-FFF2-40B4-BE49-F238E27FC236}">
+                <a16:creationId xmlns:a16="http://schemas.microsoft.com/office/drawing/2014/main" id="{5A98405C-6B3E-4D0A-B0F0-882AA734638F}"/>
+              </a:ext>
+            </a:extLst>
+          </p:cNvPr>
+          <p:cNvSpPr>
+            <a:spLocks noGrp="1"/>
+          </p:cNvSpPr>
+          <p:nvPr>
+            <p:ph idx="1"/>
+          </p:nvPr>
+        </p:nvSpPr>
+        <p:spPr/>
+        <p:txBody>
+          <a:bodyPr>
+            <a:normAutofit fontScale="70000" lnSpcReduction="20000"/>
+          </a:bodyPr>
+          <a:lstStyle/>
+          <a:p>
+            <a:r>
+              <a:rPr lang="en-IN" dirty="0"/>
+              <a:t>Conclusion towards features driving loan defaulters:</a:t>
+            </a:r>
+          </a:p>
+          <a:p>
+            <a:r>
+              <a:rPr lang="en-IN" dirty="0"/>
+              <a:t>1. </a:t>
+            </a:r>
+            <a:r>
+              <a:rPr lang="en-IN" dirty="0" err="1"/>
+              <a:t>loan_term</a:t>
+            </a:r>
+            <a:r>
+              <a:rPr lang="en-IN" dirty="0"/>
+              <a:t> : charge off increases with loan team 60 months</a:t>
+            </a:r>
+          </a:p>
+          <a:p>
+            <a:r>
+              <a:rPr lang="en-IN" dirty="0"/>
+              <a:t>2. Annual Income: Income less than 60 k higher chances of charged off </a:t>
+            </a:r>
+          </a:p>
+          <a:p>
+            <a:r>
+              <a:rPr lang="en-IN" dirty="0"/>
+              <a:t>3. Interest rate</a:t>
+            </a:r>
+          </a:p>
+          <a:p>
+            <a:r>
+              <a:rPr lang="en-IN" dirty="0"/>
+              <a:t>4. Verification status</a:t>
+            </a:r>
+          </a:p>
+          <a:p>
+            <a:r>
+              <a:rPr lang="en-IN" dirty="0"/>
+              <a:t>5. Home ownership</a:t>
+            </a:r>
+          </a:p>
+          <a:p>
+            <a:r>
+              <a:rPr lang="en-IN" dirty="0"/>
+              <a:t>6. </a:t>
+            </a:r>
+            <a:r>
+              <a:rPr lang="en-IN" dirty="0" err="1"/>
+              <a:t>emp_length</a:t>
+            </a:r>
+            <a:r>
+              <a:rPr lang="en-IN" dirty="0"/>
+              <a:t>: Higher </a:t>
+            </a:r>
+            <a:r>
+              <a:rPr lang="en-IN" dirty="0" err="1"/>
+              <a:t>emp_length</a:t>
+            </a:r>
+            <a:r>
+              <a:rPr lang="en-IN" dirty="0"/>
+              <a:t> higher is charged off</a:t>
+            </a:r>
+            <a:r>
+              <a:rPr lang="en-IN" dirty="0">
+                <a:highlight>
+                  <a:srgbClr val="FFFF00"/>
+                </a:highlight>
+              </a:rPr>
+              <a:t>(observe charged off </a:t>
+            </a:r>
+            <a:r>
+              <a:rPr lang="en-IN" dirty="0" err="1">
+                <a:highlight>
+                  <a:srgbClr val="FFFF00"/>
+                </a:highlight>
+              </a:rPr>
+              <a:t>comapartive</a:t>
+            </a:r>
+            <a:r>
+              <a:rPr lang="en-IN" dirty="0">
+                <a:highlight>
+                  <a:srgbClr val="FFFF00"/>
+                </a:highlight>
+              </a:rPr>
+              <a:t> pattern)</a:t>
+            </a:r>
+          </a:p>
+          <a:p>
+            <a:r>
+              <a:rPr lang="en-IN" dirty="0"/>
+              <a:t>7. grade and subgrade: As grade increases charged off increases , same applied </a:t>
+            </a:r>
+            <a:r>
+              <a:rPr lang="en-IN" dirty="0" err="1"/>
+              <a:t>ot</a:t>
+            </a:r>
+            <a:r>
+              <a:rPr lang="en-IN" dirty="0"/>
+              <a:t> sub grade</a:t>
+            </a:r>
+          </a:p>
+          <a:p>
+            <a:r>
+              <a:rPr lang="en-IN" dirty="0"/>
+              <a:t>8. loan amount : Higher loan amount increases charge off </a:t>
+            </a:r>
+          </a:p>
+          <a:p>
+            <a:r>
+              <a:rPr lang="en-IN" dirty="0"/>
+              <a:t>9  Emp title : when emp title is not mentioned more likely that they are not employed so annual income would be reduced  and more charged off </a:t>
+            </a:r>
+          </a:p>
+        </p:txBody>
+      </p:sp>
+    </p:spTree>
+    <p:extLst>
+      <p:ext uri="{BB962C8B-B14F-4D97-AF65-F5344CB8AC3E}">
+        <p14:creationId xmlns:p14="http://schemas.microsoft.com/office/powerpoint/2010/main" val="3073316286"/>
+      </p:ext>
+    </p:extLst>
+  </p:cSld>
+  <p:clrMapOvr>
+    <a:masterClrMapping/>
+  </p:clrMapOvr>
+</p:sld>
+</file>
+
+<file path=ppt/slides/slide37.xml><?xml version="1.0" encoding="utf-8"?>
+<p:sld xmlns:a="http://schemas.openxmlformats.org/drawingml/2006/main" xmlns:r="http://schemas.openxmlformats.org/officeDocument/2006/relationships" xmlns:p="http://schemas.openxmlformats.org/presentationml/2006/main">
+  <p:cSld>
+    <p:spTree>
+      <p:nvGrpSpPr>
+        <p:cNvPr id="1" name=""/>
+        <p:cNvGrpSpPr/>
+        <p:nvPr/>
+      </p:nvGrpSpPr>
+      <p:grpSpPr>
+        <a:xfrm>
+          <a:off x="0" y="0"/>
+          <a:ext cx="0" cy="0"/>
+          <a:chOff x="0" y="0"/>
+          <a:chExt cx="0" cy="0"/>
+        </a:xfrm>
+      </p:grpSpPr>
+      <p:sp>
+        <p:nvSpPr>
+          <p:cNvPr id="2" name="Title 1">
+            <a:extLst>
+              <a:ext uri="{FF2B5EF4-FFF2-40B4-BE49-F238E27FC236}">
+                <a16:creationId xmlns:a16="http://schemas.microsoft.com/office/drawing/2014/main" id="{4404612B-404F-4623-8E72-5B0D343CC3C9}"/>
+              </a:ext>
+            </a:extLst>
+          </p:cNvPr>
+          <p:cNvSpPr>
+            <a:spLocks noGrp="1"/>
+          </p:cNvSpPr>
+          <p:nvPr>
+            <p:ph type="title"/>
+          </p:nvPr>
+        </p:nvSpPr>
+        <p:spPr/>
+        <p:txBody>
+          <a:bodyPr/>
+          <a:lstStyle/>
+          <a:p>
+            <a:r>
+              <a:rPr lang="en-IN" dirty="0"/>
+              <a:t>Conclusion </a:t>
+            </a:r>
+            <a:r>
+              <a:rPr lang="en-IN" dirty="0" err="1"/>
+              <a:t>Contd</a:t>
+            </a:r>
+            <a:endParaRPr lang="en-IN" dirty="0"/>
+          </a:p>
+        </p:txBody>
+      </p:sp>
+      <p:sp>
+        <p:nvSpPr>
+          <p:cNvPr id="3" name="Content Placeholder 2">
+            <a:extLst>
+              <a:ext uri="{FF2B5EF4-FFF2-40B4-BE49-F238E27FC236}">
+                <a16:creationId xmlns:a16="http://schemas.microsoft.com/office/drawing/2014/main" id="{178427DB-F6AC-4638-865B-2992A6001182}"/>
+              </a:ext>
+            </a:extLst>
+          </p:cNvPr>
+          <p:cNvSpPr>
+            <a:spLocks noGrp="1"/>
+          </p:cNvSpPr>
+          <p:nvPr>
+            <p:ph idx="1"/>
+          </p:nvPr>
+        </p:nvSpPr>
+        <p:spPr/>
+        <p:txBody>
+          <a:bodyPr/>
+          <a:lstStyle/>
+          <a:p>
+            <a:r>
+              <a:rPr lang="en-IN" dirty="0">
+                <a:highlight>
+                  <a:srgbClr val="FFFF00"/>
+                </a:highlight>
+              </a:rPr>
+              <a:t>10 . Home ownership</a:t>
+            </a:r>
+          </a:p>
+          <a:p>
+            <a:r>
+              <a:rPr lang="en-IN" dirty="0">
+                <a:highlight>
+                  <a:srgbClr val="FFFF00"/>
+                </a:highlight>
+              </a:rPr>
+              <a:t>11.   </a:t>
+            </a:r>
+            <a:r>
+              <a:rPr lang="en-IN" dirty="0" err="1">
+                <a:highlight>
+                  <a:srgbClr val="FFFF00"/>
+                </a:highlight>
+              </a:rPr>
+              <a:t>dti</a:t>
+            </a:r>
+            <a:r>
+              <a:rPr lang="en-IN" dirty="0">
+                <a:highlight>
+                  <a:srgbClr val="FFFF00"/>
+                </a:highlight>
+              </a:rPr>
+              <a:t> : </a:t>
+            </a:r>
+          </a:p>
+          <a:p>
+            <a:r>
+              <a:rPr lang="en-IN" dirty="0"/>
+              <a:t>12. Grade G and annual income  &lt; 52 k has higher chances of default</a:t>
+            </a:r>
+          </a:p>
+          <a:p>
+            <a:r>
+              <a:rPr lang="en-IN" dirty="0">
+                <a:highlight>
+                  <a:srgbClr val="FFFF00"/>
+                </a:highlight>
+              </a:rPr>
+              <a:t>13 . </a:t>
+            </a:r>
+            <a:r>
+              <a:rPr lang="en-US" dirty="0">
+                <a:highlight>
+                  <a:srgbClr val="FFFF00"/>
+                </a:highlight>
+              </a:rPr>
+              <a:t>Purpose  is home improvement/major purchase &amp; income is lower than 80k/60k </a:t>
+            </a:r>
+          </a:p>
+          <a:p>
+            <a:r>
+              <a:rPr lang="en-US" dirty="0">
+                <a:highlight>
+                  <a:srgbClr val="FFFF00"/>
+                </a:highlight>
+              </a:rPr>
+              <a:t>14. funded amount high for source verified</a:t>
+            </a:r>
+          </a:p>
+          <a:p>
+            <a:r>
+              <a:rPr lang="en-US" dirty="0">
+                <a:highlight>
+                  <a:srgbClr val="FFFF00"/>
+                </a:highlight>
+              </a:rPr>
+              <a:t>15. States WA, TX, NJ, VA higher loan amount has a higher chance of charged off </a:t>
+            </a:r>
+          </a:p>
+          <a:p>
+            <a:r>
+              <a:rPr lang="en-US" dirty="0">
+                <a:highlight>
+                  <a:srgbClr val="FFFF00"/>
+                </a:highlight>
+              </a:rPr>
+              <a:t>16. </a:t>
+            </a:r>
+          </a:p>
+          <a:p>
+            <a:endParaRPr lang="en-IN" dirty="0">
+              <a:highlight>
+                <a:srgbClr val="FFFF00"/>
+              </a:highlight>
+            </a:endParaRPr>
+          </a:p>
+          <a:p>
+            <a:endParaRPr lang="en-IN" dirty="0"/>
+          </a:p>
+        </p:txBody>
+      </p:sp>
+    </p:spTree>
+    <p:extLst>
+      <p:ext uri="{BB962C8B-B14F-4D97-AF65-F5344CB8AC3E}">
+        <p14:creationId xmlns:p14="http://schemas.microsoft.com/office/powerpoint/2010/main" val="294794185"/>
       </p:ext>
     </p:extLst>
   </p:cSld>
@@ -14459,15 +16483,6 @@
 </file>
 
 <file path=customXml/item1.xml><?xml version="1.0" encoding="utf-8"?>
-<p:properties xmlns:p="http://schemas.microsoft.com/office/2006/metadata/properties" xmlns:xsi="http://www.w3.org/2001/XMLSchema-instance" xmlns:pc="http://schemas.microsoft.com/office/infopath/2007/PartnerControls">
-  <documentManagement>
-    <Status xmlns="71af3243-3dd4-4a8d-8c0d-dd76da1f02a5">Not started</Status>
-    <MediaServiceKeyPoints xmlns="71af3243-3dd4-4a8d-8c0d-dd76da1f02a5" xsi:nil="true"/>
-  </documentManagement>
-</p:properties>
-</file>
-
-<file path=customXml/item2.xml><?xml version="1.0" encoding="utf-8"?>
 <ct:contentTypeSchema xmlns:ct="http://schemas.microsoft.com/office/2006/metadata/contentType" xmlns:ma="http://schemas.microsoft.com/office/2006/metadata/properties/metaAttributes" ct:_="" ma:_="" ma:contentTypeName="Document" ma:contentTypeID="0x01010079F111ED35F8CC479449609E8A0923A6" ma:contentTypeVersion="12" ma:contentTypeDescription="Create a new document." ma:contentTypeScope="" ma:versionID="a410dd7f93c95333ffa1b60ed6adedd1">
   <xsd:schema xmlns:xsd="http://www.w3.org/2001/XMLSchema" xmlns:xs="http://www.w3.org/2001/XMLSchema" xmlns:p="http://schemas.microsoft.com/office/2006/metadata/properties" xmlns:ns2="71af3243-3dd4-4a8d-8c0d-dd76da1f02a5" xmlns:ns3="16c05727-aa75-4e4a-9b5f-8a80a1165891" targetNamespace="http://schemas.microsoft.com/office/2006/metadata/properties" ma:root="true" ma:fieldsID="a936d9baba76aa3866493feff160faab" ns2:_="" ns3:_="">
     <xsd:import namespace="71af3243-3dd4-4a8d-8c0d-dd76da1f02a5"/>
@@ -14688,6 +16703,15 @@
 </ct:contentTypeSchema>
 </file>
 
+<file path=customXml/item2.xml><?xml version="1.0" encoding="utf-8"?>
+<p:properties xmlns:p="http://schemas.microsoft.com/office/2006/metadata/properties" xmlns:xsi="http://www.w3.org/2001/XMLSchema-instance" xmlns:pc="http://schemas.microsoft.com/office/infopath/2007/PartnerControls">
+  <documentManagement>
+    <Status xmlns="71af3243-3dd4-4a8d-8c0d-dd76da1f02a5">Not started</Status>
+    <MediaServiceKeyPoints xmlns="71af3243-3dd4-4a8d-8c0d-dd76da1f02a5" xsi:nil="true"/>
+  </documentManagement>
+</p:properties>
+</file>
+
 <file path=customXml/item3.xml><?xml version="1.0" encoding="utf-8"?>
 <?mso-contentType ?>
 <FormTemplates xmlns="http://schemas.microsoft.com/sharepoint/v3/contenttype/forms">
@@ -14698,16 +16722,6 @@
 </file>
 
 <file path=customXml/itemProps1.xml><?xml version="1.0" encoding="utf-8"?>
-<ds:datastoreItem xmlns:ds="http://schemas.openxmlformats.org/officeDocument/2006/customXml" ds:itemID="{A03EEFF0-FB57-4CB4-8BFC-DF397689E2ED}">
-  <ds:schemaRefs>
-    <ds:schemaRef ds:uri="http://schemas.microsoft.com/office/2006/metadata/properties"/>
-    <ds:schemaRef ds:uri="http://schemas.microsoft.com/office/infopath/2007/PartnerControls"/>
-    <ds:schemaRef ds:uri="71af3243-3dd4-4a8d-8c0d-dd76da1f02a5"/>
-  </ds:schemaRefs>
-</ds:datastoreItem>
-</file>
-
-<file path=customXml/itemProps2.xml><?xml version="1.0" encoding="utf-8"?>
 <ds:datastoreItem xmlns:ds="http://schemas.openxmlformats.org/officeDocument/2006/customXml" ds:itemID="{93932EF5-314F-409E-8020-FEE5FA0795B9}">
   <ds:schemaRefs>
     <ds:schemaRef ds:uri="http://schemas.microsoft.com/office/2006/metadata/contentType"/>
@@ -14726,6 +16740,16 @@
 </ds:datastoreItem>
 </file>
 
+<file path=customXml/itemProps2.xml><?xml version="1.0" encoding="utf-8"?>
+<ds:datastoreItem xmlns:ds="http://schemas.openxmlformats.org/officeDocument/2006/customXml" ds:itemID="{A03EEFF0-FB57-4CB4-8BFC-DF397689E2ED}">
+  <ds:schemaRefs>
+    <ds:schemaRef ds:uri="http://schemas.microsoft.com/office/2006/metadata/properties"/>
+    <ds:schemaRef ds:uri="http://schemas.microsoft.com/office/infopath/2007/PartnerControls"/>
+    <ds:schemaRef ds:uri="71af3243-3dd4-4a8d-8c0d-dd76da1f02a5"/>
+  </ds:schemaRefs>
+</ds:datastoreItem>
+</file>
+
 <file path=customXml/itemProps3.xml><?xml version="1.0" encoding="utf-8"?>
 <ds:datastoreItem xmlns:ds="http://schemas.openxmlformats.org/officeDocument/2006/customXml" ds:itemID="{AA3F7EDC-E5B4-4BBC-9D2A-CBE6D46C37AD}">
   <ds:schemaRefs>

</xml_diff>